<commit_message>
config bug insert flow whitout category
</commit_message>
<xml_diff>
--- a/Documentacao/Fluxo de caixa.pptx
+++ b/Documentacao/Fluxo de caixa.pptx
@@ -213,7 +213,7 @@
             <a:pPr rtl="0"/>
             <a:fld id="{7FC1664B-5041-443B-91C6-A45B41A6020A}" type="datetime1">
               <a:rPr lang="pt-BR" smtClean="0"/>
-              <a:t>16/03/2021</a:t>
+              <a:t>19/03/2021</a:t>
             </a:fld>
             <a:endParaRPr lang="pt-BR" dirty="0"/>
           </a:p>
@@ -383,7 +383,7 @@
             <a:pPr rtl="0"/>
             <a:fld id="{F842E89D-3709-4A2B-9A3A-76E4CE2900D4}" type="datetime1">
               <a:rPr lang="pt-BR" noProof="0" smtClean="0"/>
-              <a:t>16/03/2021</a:t>
+              <a:t>19/03/2021</a:t>
             </a:fld>
             <a:endParaRPr lang="pt-BR" noProof="0" dirty="0"/>
           </a:p>
@@ -1698,7 +1698,7 @@
             <a:pPr rtl="0"/>
             <a:fld id="{53458F51-A324-4E75-90AA-F203FA9355A0}" type="datetime1">
               <a:rPr lang="pt-BR" noProof="0" smtClean="0"/>
-              <a:t>16/03/2021</a:t>
+              <a:t>19/03/2021</a:t>
             </a:fld>
             <a:endParaRPr lang="pt-BR" noProof="0" dirty="0"/>
           </a:p>
@@ -1822,7 +1822,7 @@
             <a:pPr rtl="0"/>
             <a:fld id="{4C35D16D-7D9B-419D-82E3-F0B9FF9A3A9D}" type="datetime1">
               <a:rPr lang="pt-BR" noProof="0" smtClean="0"/>
-              <a:t>16/03/2021</a:t>
+              <a:t>19/03/2021</a:t>
             </a:fld>
             <a:endParaRPr lang="pt-BR" noProof="0" dirty="0"/>
           </a:p>
@@ -2215,7 +2215,7 @@
             <a:pPr rtl="0"/>
             <a:fld id="{844F27DD-582C-4796-B2D9-46C6D21E31B6}" type="datetime1">
               <a:rPr lang="pt-BR" noProof="0" smtClean="0"/>
-              <a:t>16/03/2021</a:t>
+              <a:t>19/03/2021</a:t>
             </a:fld>
             <a:endParaRPr lang="pt-BR" noProof="0" dirty="0"/>
           </a:p>
@@ -3059,7 +3059,7 @@
             <a:pPr rtl="0"/>
             <a:fld id="{C61B7B32-8B9D-4D80-9F6E-0970D630EE88}" type="datetime1">
               <a:rPr lang="pt-BR" noProof="0" smtClean="0"/>
-              <a:t>16/03/2021</a:t>
+              <a:t>19/03/2021</a:t>
             </a:fld>
             <a:endParaRPr lang="pt-BR" noProof="0" dirty="0"/>
           </a:p>
@@ -3397,7 +3397,7 @@
             <a:pPr rtl="0"/>
             <a:fld id="{FA95F483-0B9E-4DD8-9124-DC336470C76F}" type="datetime1">
               <a:rPr lang="pt-BR" noProof="0" smtClean="0"/>
-              <a:t>16/03/2021</a:t>
+              <a:t>19/03/2021</a:t>
             </a:fld>
             <a:endParaRPr lang="pt-BR" noProof="0" dirty="0"/>
           </a:p>
@@ -3709,7 +3709,7 @@
             <a:pPr rtl="0"/>
             <a:fld id="{E27684DD-BD0D-4412-A976-BC0D80C04437}" type="datetime1">
               <a:rPr lang="pt-BR" noProof="0" smtClean="0"/>
-              <a:t>16/03/2021</a:t>
+              <a:t>19/03/2021</a:t>
             </a:fld>
             <a:endParaRPr lang="pt-BR" noProof="0" dirty="0"/>
           </a:p>
@@ -4308,7 +4308,7 @@
             <a:pPr rtl="0"/>
             <a:fld id="{5D230792-9F8B-479F-B4EA-6C9554157814}" type="datetime1">
               <a:rPr lang="pt-BR" noProof="0" smtClean="0"/>
-              <a:t>16/03/2021</a:t>
+              <a:t>19/03/2021</a:t>
             </a:fld>
             <a:endParaRPr lang="pt-BR" noProof="0" dirty="0"/>
           </a:p>
@@ -4575,7 +4575,7 @@
             <a:pPr rtl="0"/>
             <a:fld id="{5368CB05-7649-41F3-8F7B-A06299C7FC72}" type="datetime1">
               <a:rPr lang="pt-BR" noProof="0" smtClean="0"/>
-              <a:t>16/03/2021</a:t>
+              <a:t>19/03/2021</a:t>
             </a:fld>
             <a:endParaRPr lang="pt-BR" noProof="0" dirty="0"/>
           </a:p>
@@ -4842,7 +4842,7 @@
             <a:pPr rtl="0"/>
             <a:fld id="{26F4223D-1125-49F4-849D-69C7360807E9}" type="datetime1">
               <a:rPr lang="pt-BR" noProof="0" smtClean="0"/>
-              <a:t>16/03/2021</a:t>
+              <a:t>19/03/2021</a:t>
             </a:fld>
             <a:endParaRPr lang="pt-BR" noProof="0" dirty="0"/>
           </a:p>
@@ -5366,7 +5366,7 @@
             <a:pPr rtl="0"/>
             <a:fld id="{6AD52135-AF53-4A9A-A35F-59933B32DBCF}" type="datetime1">
               <a:rPr lang="pt-BR" noProof="0" smtClean="0"/>
-              <a:t>16/03/2021</a:t>
+              <a:t>19/03/2021</a:t>
             </a:fld>
             <a:endParaRPr lang="pt-BR" noProof="0" dirty="0"/>
           </a:p>
@@ -5490,7 +5490,7 @@
             <a:pPr rtl="0"/>
             <a:fld id="{7F812BA4-192F-42D6-B515-396E862C1C8F}" type="datetime1">
               <a:rPr lang="pt-BR" noProof="0" smtClean="0"/>
-              <a:t>16/03/2021</a:t>
+              <a:t>19/03/2021</a:t>
             </a:fld>
             <a:endParaRPr lang="pt-BR" noProof="0" dirty="0"/>
           </a:p>
@@ -5928,7 +5928,7 @@
             <a:pPr rtl="0"/>
             <a:fld id="{A43CB41E-BD29-439B-BF78-A64CBF9A3F58}" type="datetime1">
               <a:rPr lang="pt-BR" noProof="0" smtClean="0"/>
-              <a:t>16/03/2021</a:t>
+              <a:t>19/03/2021</a:t>
             </a:fld>
             <a:endParaRPr lang="pt-BR" noProof="0" dirty="0"/>
           </a:p>
@@ -6475,7 +6475,7 @@
             <a:pPr rtl="0"/>
             <a:fld id="{B6625A12-B868-480C-9272-328493957447}" type="datetime1">
               <a:rPr lang="pt-BR" noProof="0" smtClean="0"/>
-              <a:t>16/03/2021</a:t>
+              <a:t>19/03/2021</a:t>
             </a:fld>
             <a:endParaRPr lang="pt-BR" noProof="0" dirty="0"/>
           </a:p>
@@ -7359,7 +7359,9 @@
         </p:nvSpPr>
         <p:spPr/>
         <p:txBody>
-          <a:bodyPr rtlCol="0"/>
+          <a:bodyPr rtlCol="0">
+            <a:normAutofit/>
+          </a:bodyPr>
           <a:lstStyle/>
           <a:p>
             <a:pPr algn="just" rtl="0"/>
@@ -7369,7 +7371,7 @@
             </a:r>
             <a:r>
               <a:rPr lang="pt-BR" dirty="0"/>
-              <a:t>: A ideia principio surgiu de uma necessidade pessoal de controlar as finanças pessoais. Os aplicativos de bancos não estavam atendendo mais, principalmente quando o lançamento era em espécie. Para não ter que fazer no Excel esse controle, surgiu a necessidade de ter um software que facilitasse a manipulação dos dados. </a:t>
+              <a:t>: A ideia a principio surgiu de uma necessidade pessoal de controlar as finanças pessoais. Os aplicativos de bancos não estavam atendendo mais, principalmente quando o lançamento era em espécie. Evitando o uso do Excel para esse controle, surgiu a necessidade de ter um software que facilitasse a manipulação dos dados. </a:t>
             </a:r>
           </a:p>
           <a:p>
@@ -7380,7 +7382,7 @@
             </a:r>
             <a:r>
               <a:rPr lang="pt-BR" dirty="0"/>
-              <a:t>: Em seguida uma breve apresentação para colegas e familiares sobre projeto e o que poderia estar melhorando.</a:t>
+              <a:t>: Em seguida uma breve apresentação para colegas e familiares sobre o projeto e como poderia estar melhorando.</a:t>
             </a:r>
           </a:p>
         </p:txBody>

</xml_diff>